<commit_message>
Summary and Future Work Added
</commit_message>
<xml_diff>
--- a/redex/poster/Parallel Programming Poster.pptx
+++ b/redex/poster/Parallel Programming Poster.pptx
@@ -17348,7 +17348,7 @@
         <p:spPr>
           <a:xfrm>
             <a:off x="904186" y="6295353"/>
-            <a:ext cx="13591277" cy="7109616"/>
+            <a:ext cx="13591277" cy="4339627"/>
           </a:xfrm>
         </p:spPr>
         <p:txBody>
@@ -17357,54 +17357,54 @@
           <a:p>
             <a:pPr algn="just"/>
             <a:r>
-              <a:rPr lang="en-US" sz="3600" dirty="0" smtClean="0"/>
+              <a:rPr lang="en-US" sz="2800" dirty="0" smtClean="0"/>
               <a:t>Parallel programming is </a:t>
             </a:r>
             <a:r>
-              <a:rPr lang="en-US" sz="3600" dirty="0"/>
+              <a:rPr lang="en-US" sz="2800" dirty="0"/>
               <a:t>a form of computation in which </a:t>
             </a:r>
             <a:r>
-              <a:rPr lang="en-US" sz="3600" dirty="0" smtClean="0"/>
+              <a:rPr lang="en-US" sz="2800" dirty="0" smtClean="0"/>
               <a:t>multiple </a:t>
             </a:r>
             <a:r>
-              <a:rPr lang="en-US" sz="3600" dirty="0"/>
+              <a:rPr lang="en-US" sz="2800" dirty="0"/>
               <a:t>calculations are carried out simultaneously</a:t>
             </a:r>
             <a:r>
-              <a:rPr lang="en-US" sz="3600" dirty="0" smtClean="0"/>
+              <a:rPr lang="en-US" sz="2800" dirty="0" smtClean="0"/>
               <a:t>, </a:t>
             </a:r>
             <a:r>
-              <a:rPr lang="en-US" sz="3600" dirty="0"/>
+              <a:rPr lang="en-US" sz="2800" dirty="0"/>
               <a:t>operating on the principle that large problems can often be divided into smaller ones, which are then solved </a:t>
             </a:r>
             <a:r>
-              <a:rPr lang="en-US" sz="3600" dirty="0" smtClean="0"/>
+              <a:rPr lang="en-US" sz="2800" dirty="0" smtClean="0"/>
               <a:t>concurrently</a:t>
             </a:r>
             <a:r>
-              <a:rPr lang="en-US" sz="3600" dirty="0" smtClean="0"/>
+              <a:rPr lang="en-US" sz="2800" dirty="0" smtClean="0"/>
               <a:t>. This allows programs to </a:t>
             </a:r>
             <a:r>
-              <a:rPr lang="en-US" sz="3600" dirty="0" smtClean="0"/>
+              <a:rPr lang="en-US" sz="2800" dirty="0" smtClean="0"/>
               <a:t>operate faster. Parallel programming without state isn’t that difficult. When you add state to the equation though, it begins to get more challenging. This begins to cause the program to become nondeterministic depending on the order of the parallel computations. </a:t>
             </a:r>
             <a:r>
-              <a:rPr lang="en-US" sz="3600" dirty="0" smtClean="0"/>
+              <a:rPr lang="en-US" sz="2800" dirty="0" smtClean="0"/>
               <a:t>A </a:t>
             </a:r>
             <a:r>
-              <a:rPr lang="en-US" sz="3600" dirty="0"/>
+              <a:rPr lang="en-US" sz="2800" dirty="0"/>
               <a:t>n</a:t>
             </a:r>
             <a:r>
-              <a:rPr lang="en-US" sz="3600" dirty="0" smtClean="0"/>
+              <a:rPr lang="en-US" sz="2800" dirty="0" smtClean="0"/>
               <a:t>ondeterministic program could have different solutions dependent on the  order which statements are called. Our goal is to create a language that will allow a program to run various operations in parallel while still remaining deterministic. </a:t>
             </a:r>
-            <a:endParaRPr lang="en-US" sz="3600" dirty="0"/>
+            <a:endParaRPr lang="en-US" sz="2800" dirty="0"/>
           </a:p>
         </p:txBody>
       </p:sp>
@@ -17420,7 +17420,7 @@
         </p:nvSpPr>
         <p:spPr>
           <a:xfrm>
-            <a:off x="922337" y="5347357"/>
+            <a:off x="913648" y="5351225"/>
             <a:ext cx="13573126" cy="838683"/>
           </a:xfrm>
           <a:solidFill>
@@ -17454,7 +17454,7 @@
         </p:nvSpPr>
         <p:spPr>
           <a:xfrm>
-            <a:off x="15450748" y="18884375"/>
+            <a:off x="15450748" y="9458465"/>
             <a:ext cx="12972724" cy="14012470"/>
           </a:xfrm>
         </p:spPr>
@@ -17663,8 +17663,8 @@
         </p:nvSpPr>
         <p:spPr>
           <a:xfrm>
-            <a:off x="896245" y="14170192"/>
-            <a:ext cx="13571534" cy="9547207"/>
+            <a:off x="896245" y="11523262"/>
+            <a:ext cx="13571534" cy="6235531"/>
           </a:xfrm>
         </p:spPr>
         <p:txBody>
@@ -17673,42 +17673,42 @@
           <a:p>
             <a:pPr algn="just"/>
             <a:r>
-              <a:rPr lang="en-US" sz="3600" dirty="0" smtClean="0"/>
+              <a:rPr lang="en-US" sz="2800" dirty="0" smtClean="0"/>
               <a:t>Before I began working on this project, there was already an implementation of the counter lvar, </a:t>
             </a:r>
             <a:r>
-              <a:rPr lang="en-US" sz="3600" dirty="0" smtClean="0"/>
+              <a:rPr lang="en-US" sz="2800" dirty="0" smtClean="0"/>
               <a:t>figure 1c. The counter lvar keeps track of the max value that has been entered. If the user were to put in values x and y into the lvar, it would keep track of max( x, y ). If the user were to then use the get function on any value that is less than or equal to max( x, y ), it would return true. If they were to call get with a value greater than max( x, y), it would return false.</a:t>
             </a:r>
-            <a:endParaRPr lang="en-US" sz="3600" dirty="0" smtClean="0"/>
+            <a:endParaRPr lang="en-US" sz="2800" dirty="0" smtClean="0"/>
           </a:p>
           <a:p>
             <a:pPr algn="just"/>
-            <a:endParaRPr lang="en-US" sz="3600" dirty="0" smtClean="0"/>
+            <a:endParaRPr lang="en-US" sz="2800" dirty="0" smtClean="0"/>
           </a:p>
           <a:p>
             <a:pPr algn="just"/>
             <a:r>
-              <a:rPr lang="en-US" sz="3600" dirty="0" smtClean="0"/>
+              <a:rPr lang="en-US" sz="2800" dirty="0" smtClean="0"/>
               <a:t>The pair </a:t>
             </a:r>
             <a:r>
-              <a:rPr lang="en-US" sz="3600" dirty="0" smtClean="0"/>
+              <a:rPr lang="en-US" sz="2800" dirty="0" smtClean="0"/>
               <a:t>lvar, figure 1b, </a:t>
             </a:r>
             <a:r>
-              <a:rPr lang="en-US" sz="3600" dirty="0" smtClean="0"/>
+              <a:rPr lang="en-US" sz="2800" dirty="0" smtClean="0"/>
               <a:t>allows </a:t>
             </a:r>
             <a:r>
-              <a:rPr lang="en-US" sz="3600" dirty="0" smtClean="0"/>
+              <a:rPr lang="en-US" sz="2800" dirty="0" smtClean="0"/>
               <a:t>for pairs of values. </a:t>
             </a:r>
             <a:r>
-              <a:rPr lang="en-US" sz="3600" dirty="0" smtClean="0"/>
+              <a:rPr lang="en-US" sz="2800" dirty="0" smtClean="0"/>
               <a:t>This lvar only allows for one value in each index. The order in which the program puts in the values isn’t important. This lvar will also allow for inputting both values in parallel. Once it has both values assigned, if the program would attempt to put another value it, the lvar would reach top which would throw an error. Being able to implement this lvar is on way of solving our problem of keeping a parallel program deterministic. </a:t>
             </a:r>
-            <a:endParaRPr lang="en-US" sz="3600" dirty="0"/>
+            <a:endParaRPr lang="en-US" sz="2800" dirty="0"/>
           </a:p>
         </p:txBody>
       </p:sp>
@@ -17724,7 +17724,7 @@
         </p:nvSpPr>
         <p:spPr>
           <a:xfrm>
-            <a:off x="15154277" y="5383869"/>
+            <a:off x="888304" y="24486600"/>
             <a:ext cx="13579475" cy="754045"/>
           </a:xfrm>
           <a:solidFill>
@@ -17780,7 +17780,7 @@
         </p:nvSpPr>
         <p:spPr>
           <a:xfrm>
-            <a:off x="29395741" y="5347357"/>
+            <a:off x="29395741" y="5347358"/>
             <a:ext cx="13576029" cy="923322"/>
           </a:xfrm>
           <a:solidFill>
@@ -17795,32 +17795,11 @@
           <a:lstStyle/>
           <a:p>
             <a:r>
-              <a:rPr lang="en-US" sz="4800" dirty="0">
-                <a:latin typeface="Times New Roman" pitchFamily="18" charset="0"/>
-                <a:cs typeface="Times New Roman" pitchFamily="18" charset="0"/>
-              </a:rPr>
-              <a:t>Determinism for </a:t>
-            </a:r>
-            <a:r>
-              <a:rPr lang="el-GR" sz="4800" dirty="0">
-                <a:latin typeface="Times New Roman" pitchFamily="18" charset="0"/>
-                <a:cs typeface="Times New Roman" pitchFamily="18" charset="0"/>
-              </a:rPr>
-              <a:t>λ</a:t>
-            </a:r>
-            <a:r>
-              <a:rPr lang="en-US" sz="4800" dirty="0">
-                <a:latin typeface="Times New Roman" pitchFamily="18" charset="0"/>
-                <a:cs typeface="Times New Roman" pitchFamily="18" charset="0"/>
-              </a:rPr>
-              <a:t> </a:t>
-            </a:r>
-            <a:r>
               <a:rPr lang="en-US" sz="4800" dirty="0" smtClean="0">
                 <a:latin typeface="Times New Roman" pitchFamily="18" charset="0"/>
                 <a:cs typeface="Times New Roman" pitchFamily="18" charset="0"/>
               </a:rPr>
-              <a:t>LVar</a:t>
+              <a:t>Summary</a:t>
             </a:r>
             <a:endParaRPr lang="en-US" sz="4800" dirty="0">
               <a:latin typeface="Times New Roman" pitchFamily="18" charset="0"/>
@@ -18629,7 +18608,7 @@
         </p:blipFill>
         <p:spPr bwMode="auto">
           <a:xfrm>
-            <a:off x="16069897" y="20568241"/>
+            <a:off x="16069897" y="11142331"/>
             <a:ext cx="12173525" cy="9317322"/>
           </a:xfrm>
           <a:prstGeom prst="rect">
@@ -18847,8 +18826,8 @@
         </p:blipFill>
         <p:spPr bwMode="auto">
           <a:xfrm>
-            <a:off x="15588059" y="9733144"/>
-            <a:ext cx="17157842" cy="2550285"/>
+            <a:off x="2223756" y="28421578"/>
+            <a:ext cx="11930921" cy="1773373"/>
           </a:xfrm>
           <a:prstGeom prst="rect">
             <a:avLst/>
@@ -18909,8 +18888,8 @@
         </p:blipFill>
         <p:spPr bwMode="auto">
           <a:xfrm>
-            <a:off x="15311236" y="6538468"/>
-            <a:ext cx="7678831" cy="3746760"/>
+            <a:off x="1946934" y="25226902"/>
+            <a:ext cx="5339572" cy="2605357"/>
           </a:xfrm>
           <a:prstGeom prst="rect">
             <a:avLst/>
@@ -18971,8 +18950,8 @@
         </p:blipFill>
         <p:spPr bwMode="auto">
           <a:xfrm>
-            <a:off x="20529122" y="10793371"/>
-            <a:ext cx="7275715" cy="3704360"/>
+            <a:off x="7164820" y="29481805"/>
+            <a:ext cx="5059260" cy="2575873"/>
           </a:xfrm>
           <a:prstGeom prst="rect">
             <a:avLst/>
@@ -19014,7 +18993,7 @@
         </p:nvSpPr>
         <p:spPr>
           <a:xfrm>
-            <a:off x="29407393" y="20932834"/>
+            <a:off x="29455390" y="17810478"/>
             <a:ext cx="13573126" cy="923322"/>
           </a:xfrm>
           <a:solidFill>
@@ -19048,7 +19027,7 @@
         </p:nvSpPr>
         <p:spPr>
           <a:xfrm>
-            <a:off x="29395741" y="21882777"/>
+            <a:off x="29395741" y="18706461"/>
             <a:ext cx="13571537" cy="860425"/>
           </a:xfrm>
         </p:spPr>
@@ -19059,10 +19038,193 @@
           <a:lstStyle/>
           <a:p>
             <a:r>
-              <a:rPr lang="en-US" sz="3200" dirty="0" smtClean="0"/>
-              <a:t>Info written by Lindsey</a:t>
-            </a:r>
-            <a:endParaRPr lang="en-US" sz="3200" dirty="0"/>
+              <a:rPr lang="en-US" sz="2800" dirty="0"/>
+              <a:t>Future work on </a:t>
+            </a:r>
+            <a:r>
+              <a:rPr lang="en-US" sz="2800" dirty="0" err="1"/>
+              <a:t>lambdaLVar</a:t>
+            </a:r>
+            <a:r>
+              <a:rPr lang="en-US" sz="2800" dirty="0"/>
+              <a:t>: </a:t>
+            </a:r>
+          </a:p>
+          <a:p>
+            <a:pPr lvl="1"/>
+            <a:r>
+              <a:rPr lang="en-US" sz="2800" dirty="0"/>
+              <a:t>Automatic test generation: The flexibility of </a:t>
+            </a:r>
+            <a:r>
+              <a:rPr lang="en-US" sz="2800" dirty="0" err="1"/>
+              <a:t>lambdaLVar</a:t>
+            </a:r>
+            <a:r>
+              <a:rPr lang="en-US" sz="2800" dirty="0"/>
+              <a:t> means that there is always more work to do: we can create new languages with </a:t>
+            </a:r>
+            <a:r>
+              <a:rPr lang="en-US" sz="2800" dirty="0" err="1"/>
+              <a:t>lambdaLVar</a:t>
+            </a:r>
+            <a:r>
+              <a:rPr lang="en-US" sz="2800" dirty="0"/>
+              <a:t>, but for each new language, if we want to see if it's working in the way we intend, we have to manually write tests.  In the future, we would like to exploit the random test generation features of </a:t>
+            </a:r>
+            <a:r>
+              <a:rPr lang="en-US" sz="2800" dirty="0" err="1"/>
+              <a:t>Redex</a:t>
+            </a:r>
+            <a:r>
+              <a:rPr lang="en-US" sz="2800" dirty="0"/>
+              <a:t> to automate some of this work for us.</a:t>
+            </a:r>
+          </a:p>
+          <a:p>
+            <a:pPr lvl="1"/>
+            <a:r>
+              <a:rPr lang="en-US" sz="2800" dirty="0"/>
+              <a:t>Decoupling </a:t>
+            </a:r>
+            <a:r>
+              <a:rPr lang="en-US" sz="2800" dirty="0" err="1"/>
+              <a:t>lambdaLVar</a:t>
+            </a:r>
+            <a:r>
+              <a:rPr lang="en-US" sz="2800" dirty="0"/>
+              <a:t> from </a:t>
+            </a:r>
+            <a:r>
+              <a:rPr lang="en-US" sz="2800" dirty="0" err="1"/>
+              <a:t>Redex</a:t>
+            </a:r>
+            <a:r>
+              <a:rPr lang="en-US" sz="2800" dirty="0"/>
+              <a:t>: </a:t>
+            </a:r>
+            <a:r>
+              <a:rPr lang="en-US" sz="2800" dirty="0" err="1"/>
+              <a:t>lambdaLVar</a:t>
+            </a:r>
+            <a:r>
+              <a:rPr lang="en-US" sz="2800" dirty="0"/>
+              <a:t> programs can be cumbersome to work with because one has to write them inside the </a:t>
+            </a:r>
+            <a:r>
+              <a:rPr lang="en-US" sz="2800" dirty="0" err="1"/>
+              <a:t>Redex</a:t>
+            </a:r>
+            <a:r>
+              <a:rPr lang="en-US" sz="2800" dirty="0"/>
+              <a:t> framework.  In the future, though, we should be able to decouple </a:t>
+            </a:r>
+            <a:r>
+              <a:rPr lang="en-US" sz="2800" dirty="0" err="1"/>
+              <a:t>lambdaLVar</a:t>
+            </a:r>
+            <a:r>
+              <a:rPr lang="en-US" sz="2800" dirty="0"/>
+              <a:t> programs and write them independently from </a:t>
+            </a:r>
+            <a:r>
+              <a:rPr lang="en-US" sz="2800" dirty="0" err="1"/>
+              <a:t>Redex</a:t>
+            </a:r>
+            <a:r>
+              <a:rPr lang="en-US" sz="2800" dirty="0"/>
+              <a:t>, using Racket's "#</a:t>
+            </a:r>
+            <a:r>
+              <a:rPr lang="en-US" sz="2800" dirty="0" err="1"/>
+              <a:t>lang</a:t>
+            </a:r>
+            <a:r>
+              <a:rPr lang="en-US" sz="2800" dirty="0"/>
+              <a:t>" protocol.  They would still run on the </a:t>
+            </a:r>
+            <a:r>
+              <a:rPr lang="en-US" sz="2800" dirty="0" err="1"/>
+              <a:t>Redex</a:t>
+            </a:r>
+            <a:r>
+              <a:rPr lang="en-US" sz="2800" dirty="0"/>
+              <a:t> infrastructure, but it would be hidden from the user.  Even better, we could add things like syntax highlighting.  Then </a:t>
+            </a:r>
+            <a:r>
+              <a:rPr lang="en-US" sz="2800" dirty="0" err="1"/>
+              <a:t>lambdaLVar</a:t>
+            </a:r>
+            <a:r>
+              <a:rPr lang="en-US" sz="2800" dirty="0"/>
+              <a:t> programs would begin to "feel" more like programs, rather than just pieces of data that </a:t>
+            </a:r>
+            <a:r>
+              <a:rPr lang="en-US" sz="2800" dirty="0" err="1"/>
+              <a:t>Redex</a:t>
+            </a:r>
+            <a:r>
+              <a:rPr lang="en-US" sz="2800" dirty="0"/>
+              <a:t> is manipulating.</a:t>
+            </a:r>
+            <a:br>
+              <a:rPr lang="en-US" sz="2800" dirty="0"/>
+            </a:br>
+            <a:endParaRPr lang="en-US" sz="2800" dirty="0"/>
+          </a:p>
+          <a:p>
+            <a:r>
+              <a:rPr lang="en-US" sz="2800" dirty="0"/>
+              <a:t>Future work on LVars in general:</a:t>
+            </a:r>
+          </a:p>
+          <a:p>
+            <a:pPr lvl="1"/>
+            <a:r>
+              <a:rPr lang="en-US" sz="2800" dirty="0"/>
+              <a:t>There is still much work to be done to figure out effective ways of programming with LVars.  We want LVar libraries to be available for use in languages beyond the special-purpose </a:t>
+            </a:r>
+            <a:r>
+              <a:rPr lang="en-US" sz="2800" dirty="0" err="1"/>
+              <a:t>lambdaLVar</a:t>
+            </a:r>
+            <a:r>
+              <a:rPr lang="en-US" sz="2800" dirty="0"/>
+              <a:t> language, and eventually, we want to build libraries of efficient concurrent data structures on top of LVars.  (Ask Lindsey for more details on the current roadmap for LVars!)</a:t>
+            </a:r>
+          </a:p>
+          <a:p>
+            <a:r>
+              <a:rPr lang="en-US" sz="2800" dirty="0"/>
+              <a:t>Future work on the </a:t>
+            </a:r>
+            <a:r>
+              <a:rPr lang="en-US" sz="2800" dirty="0" err="1"/>
+              <a:t>metatheory</a:t>
+            </a:r>
+            <a:r>
+              <a:rPr lang="en-US" sz="2800" dirty="0"/>
+              <a:t> of LVars:</a:t>
+            </a:r>
+            <a:br>
+              <a:rPr lang="en-US" sz="2800" dirty="0"/>
+            </a:br>
+            <a:endParaRPr lang="en-US" sz="2800" dirty="0"/>
+          </a:p>
+          <a:p>
+            <a:pPr lvl="1"/>
+            <a:r>
+              <a:rPr lang="en-US" sz="2800" dirty="0"/>
+              <a:t>As we work out better ways to program with LVars in general, what we learn will inform the design of the next version of </a:t>
+            </a:r>
+            <a:r>
+              <a:rPr lang="en-US" sz="2800" dirty="0" err="1"/>
+              <a:t>lambdaLVar</a:t>
+            </a:r>
+            <a:r>
+              <a:rPr lang="en-US" sz="2800" dirty="0"/>
+              <a:t>, so we'll need to state and prove a determinism property for that new and improved language.</a:t>
+            </a:r>
           </a:p>
         </p:txBody>
       </p:sp>
@@ -19112,7 +19274,7 @@
         </p:nvSpPr>
         <p:spPr>
           <a:xfrm>
-            <a:off x="29407989" y="11344000"/>
+            <a:off x="29407989" y="8985826"/>
             <a:ext cx="13573126" cy="923322"/>
           </a:xfrm>
           <a:solidFill>
@@ -19146,7 +19308,7 @@
         </p:nvSpPr>
         <p:spPr>
           <a:xfrm>
-            <a:off x="29455390" y="12214133"/>
+            <a:off x="29455390" y="9904085"/>
             <a:ext cx="13571537" cy="7519973"/>
           </a:xfrm>
         </p:spPr>
@@ -19158,18 +19320,18 @@
           <a:p>
             <a:pPr algn="just"/>
             <a:r>
-              <a:rPr lang="en-US" sz="3600" dirty="0" smtClean="0"/>
+              <a:rPr lang="en-US" sz="2800" dirty="0" smtClean="0"/>
               <a:t>We developed our language in Reddex</a:t>
             </a:r>
             <a:r>
-              <a:rPr lang="en-US" sz="3600" dirty="0" smtClean="0"/>
+              <a:rPr lang="en-US" sz="2800" dirty="0" smtClean="0"/>
               <a:t>. Reddex is a programming language used for creating programming languages which is embedded in the racket language. Our development software of choice was Dr. Racket, shown below</a:t>
             </a:r>
             <a:r>
-              <a:rPr lang="en-US" sz="3200" dirty="0" smtClean="0"/>
+              <a:rPr lang="en-US" sz="2400" dirty="0" smtClean="0"/>
               <a:t>.</a:t>
             </a:r>
-            <a:endParaRPr lang="en-US" sz="3200" dirty="0" smtClean="0"/>
+            <a:endParaRPr lang="en-US" sz="2400" dirty="0" smtClean="0"/>
           </a:p>
         </p:txBody>
       </p:sp>
@@ -19196,7 +19358,7 @@
         </p:blipFill>
         <p:spPr bwMode="auto">
           <a:xfrm>
-            <a:off x="30699086" y="14818102"/>
+            <a:off x="30699086" y="11689912"/>
             <a:ext cx="10832554" cy="5822498"/>
           </a:xfrm>
           <a:prstGeom prst="rect">
@@ -19250,7 +19412,7 @@
         </p:blipFill>
         <p:spPr bwMode="auto">
           <a:xfrm>
-            <a:off x="37354164" y="16464717"/>
+            <a:off x="37354164" y="13336527"/>
             <a:ext cx="2942074" cy="2870607"/>
           </a:xfrm>
           <a:prstGeom prst="rect">
@@ -19293,7 +19455,7 @@
         </p:nvSpPr>
         <p:spPr>
           <a:xfrm>
-            <a:off x="915295" y="13351967"/>
+            <a:off x="915295" y="10753163"/>
             <a:ext cx="13579475" cy="754045"/>
           </a:xfrm>
           <a:solidFill>
@@ -19350,7 +19512,7 @@
         </p:blipFill>
         <p:spPr bwMode="auto">
           <a:xfrm>
-            <a:off x="1376112" y="23799217"/>
+            <a:off x="1376112" y="17596022"/>
             <a:ext cx="12744450" cy="6858000"/>
           </a:xfrm>
           <a:prstGeom prst="rect">
@@ -19393,8 +19555,8 @@
         </p:nvSpPr>
         <p:spPr>
           <a:xfrm>
-            <a:off x="15214600" y="13954125"/>
-            <a:ext cx="13571538" cy="7519988"/>
+            <a:off x="15200908" y="6150975"/>
+            <a:ext cx="13571538" cy="3753110"/>
           </a:xfrm>
         </p:spPr>
         <p:txBody>
@@ -19404,12 +19566,9 @@
           <a:lstStyle/>
           <a:p>
             <a:r>
-              <a:rPr lang="en-US" sz="3600" dirty="0" smtClean="0"/>
-              <a:t>This is the part where I talk about determinism in our program based on figure 2.</a:t>
-            </a:r>
-          </a:p>
-          <a:p>
-            <a:endParaRPr lang="en-US" sz="3600" dirty="0"/>
+              <a:rPr lang="en-US" sz="2800" dirty="0" smtClean="0"/>
+              <a:t>This is the part where I talk about determinism in our program based on figure 2</a:t>
+            </a:r>
           </a:p>
         </p:txBody>
       </p:sp>
@@ -19426,7 +19585,7 @@
         <p:spPr>
           <a:xfrm>
             <a:off x="29409578" y="6265790"/>
-            <a:ext cx="13571537" cy="7519973"/>
+            <a:ext cx="13571537" cy="2685705"/>
           </a:xfrm>
         </p:spPr>
         <p:txBody>
@@ -19437,13 +19596,27 @@
           <a:p>
             <a:pPr algn="just"/>
             <a:r>
-              <a:rPr lang="en-US" sz="3600" dirty="0" smtClean="0"/>
-              <a:t>Figure 3 shows two different parallel program flow charts. The one on the left will always be deterministic since </a:t>
-            </a:r>
-            <a:r>
-              <a:rPr lang="en-US" sz="3600" dirty="0" smtClean="0"/>
-              <a:t>the puts and gets are done separately. The one on the right though will be nondeterministic since the put and get are evaluated in parallel. Even though the program seemingly operates simultaneously, it actually does the operations separately in a random order depending on what the system decides to do first. This could cause problems if the system decides to operate the get before the put. </a:t>
-            </a:r>
+              <a:rPr lang="en-US" sz="2800" dirty="0"/>
+              <a:t>For some lattices, the least upper bound operation was a simple built-in function like taking the maximum of two numbers; for other lattices it was more sophisticated and required us to write our own function.</a:t>
+            </a:r>
+          </a:p>
+          <a:p>
+            <a:pPr algn="just"/>
+            <a:r>
+              <a:rPr lang="en-US" sz="2800" dirty="0"/>
+              <a:t>We instantiated </a:t>
+            </a:r>
+            <a:r>
+              <a:rPr lang="en-US" sz="2800" dirty="0" err="1"/>
+              <a:t>lambdaLVar</a:t>
+            </a:r>
+            <a:r>
+              <a:rPr lang="en-US" sz="2800" dirty="0"/>
+              <a:t> in a variety of ways, and for each instantiation, we created test suites to check if the programs we wrote were working the way we intended.</a:t>
+            </a:r>
+          </a:p>
+          <a:p>
+            <a:pPr algn="just"/>
             <a:endParaRPr lang="en-US" sz="3600" dirty="0" smtClean="0"/>
           </a:p>
         </p:txBody>
@@ -19456,7 +19629,7 @@
         </p:nvSpPr>
         <p:spPr>
           <a:xfrm>
-            <a:off x="26384196" y="19534051"/>
+            <a:off x="26384196" y="21459091"/>
             <a:ext cx="1019638" cy="400110"/>
           </a:xfrm>
           <a:prstGeom prst="rect">
@@ -19491,7 +19664,7 @@
         </p:nvSpPr>
         <p:spPr>
           <a:xfrm>
-            <a:off x="27403834" y="6920133"/>
+            <a:off x="12725308" y="31272049"/>
             <a:ext cx="1019638" cy="400110"/>
           </a:xfrm>
           <a:prstGeom prst="rect">
@@ -19515,6 +19688,250 @@
               <a:t>Figure 2</a:t>
             </a:r>
             <a:endParaRPr lang="en-US" sz="2000" dirty="0"/>
+          </a:p>
+        </p:txBody>
+      </p:sp>
+      <p:sp>
+        <p:nvSpPr>
+          <p:cNvPr id="84" name="Text Placeholder 386"/>
+          <p:cNvSpPr>
+            <a:spLocks noGrp="1"/>
+          </p:cNvSpPr>
+          <p:nvPr>
+            <p:ph type="body" sz="quarter" idx="24"/>
+          </p:nvPr>
+        </p:nvSpPr>
+        <p:spPr>
+          <a:xfrm>
+            <a:off x="15214600" y="5396930"/>
+            <a:ext cx="13579475" cy="754045"/>
+          </a:xfrm>
+          <a:solidFill>
+            <a:schemeClr val="tx2">
+              <a:lumMod val="60000"/>
+              <a:lumOff val="40000"/>
+            </a:schemeClr>
+          </a:solidFill>
+        </p:spPr>
+        <p:txBody>
+          <a:bodyPr>
+            <a:noAutofit/>
+          </a:bodyPr>
+          <a:lstStyle/>
+          <a:p>
+            <a:r>
+              <a:rPr lang="en-US" sz="4800" dirty="0">
+                <a:latin typeface="Times New Roman" pitchFamily="18" charset="0"/>
+                <a:cs typeface="Times New Roman" pitchFamily="18" charset="0"/>
+              </a:rPr>
+              <a:t>Determinism for </a:t>
+            </a:r>
+            <a:r>
+              <a:rPr lang="el-GR" sz="4800" dirty="0">
+                <a:latin typeface="Times New Roman" pitchFamily="18" charset="0"/>
+                <a:cs typeface="Times New Roman" pitchFamily="18" charset="0"/>
+              </a:rPr>
+              <a:t>λ</a:t>
+            </a:r>
+            <a:r>
+              <a:rPr lang="en-US" sz="4800" dirty="0">
+                <a:latin typeface="Times New Roman" pitchFamily="18" charset="0"/>
+                <a:cs typeface="Times New Roman" pitchFamily="18" charset="0"/>
+              </a:rPr>
+              <a:t> LVar</a:t>
+            </a:r>
+            <a:endParaRPr lang="en-US" sz="4800" dirty="0">
+              <a:latin typeface="Times New Roman" pitchFamily="18" charset="0"/>
+              <a:cs typeface="Times New Roman" pitchFamily="18" charset="0"/>
+            </a:endParaRPr>
+          </a:p>
+        </p:txBody>
+      </p:sp>
+      <p:sp>
+        <p:nvSpPr>
+          <p:cNvPr id="85" name="Text Placeholder 385"/>
+          <p:cNvSpPr>
+            <a:spLocks noGrp="1"/>
+          </p:cNvSpPr>
+          <p:nvPr>
+            <p:ph type="body" sz="quarter" idx="23"/>
+          </p:nvPr>
+        </p:nvSpPr>
+        <p:spPr>
+          <a:xfrm>
+            <a:off x="15222538" y="22298886"/>
+            <a:ext cx="13571537" cy="3111800"/>
+          </a:xfrm>
+        </p:spPr>
+        <p:txBody>
+          <a:bodyPr>
+            <a:noAutofit/>
+          </a:bodyPr>
+          <a:lstStyle/>
+          <a:p>
+            <a:pPr algn="just"/>
+            <a:r>
+              <a:rPr lang="en-US" sz="2800" dirty="0" smtClean="0"/>
+              <a:t>Figure 3 shows two different parallel program flow charts. The one on the left will always be deterministic since </a:t>
+            </a:r>
+            <a:r>
+              <a:rPr lang="en-US" sz="2800" dirty="0" smtClean="0"/>
+              <a:t>the puts and gets are done separately. The one on the right though will be nondeterministic since the put and get are evaluated in parallel. Even though the program seemingly operates simultaneously, it actually does the operations separately in a random order depending on what the system decides to do first. This could cause problems if the system decides to operate the get before the put. </a:t>
+            </a:r>
+            <a:endParaRPr lang="en-US" sz="2800" dirty="0" smtClean="0"/>
+          </a:p>
+        </p:txBody>
+      </p:sp>
+      <p:sp>
+        <p:nvSpPr>
+          <p:cNvPr id="86" name="Text Placeholder 553"/>
+          <p:cNvSpPr>
+            <a:spLocks noGrp="1"/>
+          </p:cNvSpPr>
+          <p:nvPr>
+            <p:ph type="body" sz="quarter" idx="25"/>
+          </p:nvPr>
+        </p:nvSpPr>
+        <p:spPr>
+          <a:xfrm>
+            <a:off x="15200908" y="25466747"/>
+            <a:ext cx="13576029" cy="923322"/>
+          </a:xfrm>
+          <a:solidFill>
+            <a:schemeClr val="tx2">
+              <a:lumMod val="60000"/>
+              <a:lumOff val="40000"/>
+            </a:schemeClr>
+          </a:solidFill>
+        </p:spPr>
+        <p:txBody>
+          <a:bodyPr/>
+          <a:lstStyle/>
+          <a:p>
+            <a:r>
+              <a:rPr lang="en-US" sz="4800" dirty="0" smtClean="0">
+                <a:latin typeface="Times New Roman" pitchFamily="18" charset="0"/>
+                <a:cs typeface="Times New Roman" pitchFamily="18" charset="0"/>
+              </a:rPr>
+              <a:t>Summary</a:t>
+            </a:r>
+            <a:endParaRPr lang="en-US" sz="4800" dirty="0">
+              <a:latin typeface="Times New Roman" pitchFamily="18" charset="0"/>
+              <a:cs typeface="Times New Roman" pitchFamily="18" charset="0"/>
+            </a:endParaRPr>
+          </a:p>
+        </p:txBody>
+      </p:sp>
+      <p:sp>
+        <p:nvSpPr>
+          <p:cNvPr id="87" name="Text Placeholder 385"/>
+          <p:cNvSpPr>
+            <a:spLocks noGrp="1"/>
+          </p:cNvSpPr>
+          <p:nvPr>
+            <p:ph type="body" sz="quarter" idx="23"/>
+          </p:nvPr>
+        </p:nvSpPr>
+        <p:spPr>
+          <a:xfrm>
+            <a:off x="15140908" y="26390069"/>
+            <a:ext cx="13571537" cy="5792607"/>
+          </a:xfrm>
+        </p:spPr>
+        <p:txBody>
+          <a:bodyPr>
+            <a:noAutofit/>
+          </a:bodyPr>
+          <a:lstStyle/>
+          <a:p>
+            <a:pPr algn="just"/>
+            <a:r>
+              <a:rPr lang="en-US" sz="2800" dirty="0"/>
+              <a:t>In this project, we worked on extending </a:t>
+            </a:r>
+            <a:r>
+              <a:rPr lang="en-US" sz="2800" dirty="0" err="1"/>
+              <a:t>lambdaLVar</a:t>
+            </a:r>
+            <a:r>
+              <a:rPr lang="en-US" sz="2800" dirty="0"/>
+              <a:t>, a small programming language that uses LVars.  Because </a:t>
+            </a:r>
+            <a:r>
+              <a:rPr lang="en-US" sz="2800" dirty="0" err="1"/>
+              <a:t>lambdaLVar</a:t>
+            </a:r>
+            <a:r>
+              <a:rPr lang="en-US" sz="2800" dirty="0"/>
+              <a:t> is based on a lattice that is specified by the language user, </a:t>
+            </a:r>
+            <a:r>
+              <a:rPr lang="en-US" sz="2800" dirty="0" err="1"/>
+              <a:t>lambdaLVar</a:t>
+            </a:r>
+            <a:r>
+              <a:rPr lang="en-US" sz="2800" dirty="0"/>
+              <a:t> is actually not just one language, but a family of languages: instantiate </a:t>
+            </a:r>
+            <a:r>
+              <a:rPr lang="en-US" sz="2800" dirty="0" err="1"/>
+              <a:t>lambdaLVar</a:t>
+            </a:r>
+            <a:r>
+              <a:rPr lang="en-US" sz="2800" dirty="0"/>
+              <a:t> with one lattice and you get one deterministic parallel language; with another lattice, and you get </a:t>
+            </a:r>
+            <a:r>
+              <a:rPr lang="en-US" sz="2800" dirty="0" smtClean="0"/>
+              <a:t>another.</a:t>
+            </a:r>
+          </a:p>
+          <a:p>
+            <a:pPr algn="just"/>
+            <a:r>
+              <a:rPr lang="en-US" sz="2800" dirty="0" smtClean="0"/>
+              <a:t>In </a:t>
+            </a:r>
+            <a:r>
+              <a:rPr lang="en-US" sz="2800" dirty="0"/>
+              <a:t>this project we looked at some ways to instantiate </a:t>
+            </a:r>
+            <a:r>
+              <a:rPr lang="en-US" sz="2800" dirty="0" err="1"/>
+              <a:t>lambdaLVar</a:t>
+            </a:r>
+            <a:r>
+              <a:rPr lang="en-US" sz="2800" dirty="0"/>
+              <a:t> with new lattices.  We found that to instantiate </a:t>
+            </a:r>
+            <a:r>
+              <a:rPr lang="en-US" sz="2800" dirty="0" err="1"/>
+              <a:t>lambdaLVar</a:t>
+            </a:r>
+            <a:r>
+              <a:rPr lang="en-US" sz="2800" dirty="0"/>
+              <a:t> with a lattice, one has to specify a "least upper bound" (</a:t>
+            </a:r>
+            <a:r>
+              <a:rPr lang="en-US" sz="2800" dirty="0" err="1"/>
+              <a:t>lub</a:t>
+            </a:r>
+            <a:r>
+              <a:rPr lang="en-US" sz="2800" dirty="0"/>
+              <a:t>) operation that specifies how two lattice elements should be combined together.  This </a:t>
+            </a:r>
+            <a:r>
+              <a:rPr lang="en-US" sz="2800" dirty="0" err="1"/>
+              <a:t>lub</a:t>
+            </a:r>
+            <a:r>
+              <a:rPr lang="en-US" sz="2800" dirty="0"/>
+              <a:t> operation corresponds to how, when two threads write to a variable, the writes done by the two threads are merged together after the two threads finish </a:t>
+            </a:r>
+            <a:r>
+              <a:rPr lang="en-US" sz="2800" dirty="0" smtClean="0"/>
+              <a:t>running.</a:t>
+            </a:r>
           </a:p>
         </p:txBody>
       </p:sp>

</xml_diff>